<commit_message>
mimari slaytlarına notlar eklendi
</commit_message>
<xml_diff>
--- a/Bilgisayar-Mimarisi-Slaytlar/Uygulama_2.pptx
+++ b/Bilgisayar-Mimarisi-Slaytlar/Uygulama_2.pptx
@@ -177,10 +177,9 @@
           <a:lstStyle/>
           <a:p>
             <a:r>
-              <a:rPr lang="tr-TR" smtClean="0"/>
+              <a:rPr lang="tr-TR"/>
               <a:t>Asıl başlık stili için tıklatın</a:t>
             </a:r>
-            <a:endParaRPr lang="tr-TR"/>
           </a:p>
         </p:txBody>
       </p:sp>
@@ -296,10 +295,9 @@
           </a:lstStyle>
           <a:p>
             <a:r>
-              <a:rPr lang="tr-TR" smtClean="0"/>
+              <a:rPr lang="tr-TR"/>
               <a:t>Asıl alt başlık stilini düzenlemek için tıklatın</a:t>
             </a:r>
-            <a:endParaRPr lang="tr-TR"/>
           </a:p>
         </p:txBody>
       </p:sp>
@@ -320,7 +318,7 @@
           <a:p>
             <a:fld id="{C9376674-BA99-403F-8146-953CBF888941}" type="datetimeFigureOut">
               <a:rPr lang="tr-TR" smtClean="0"/>
-              <a:t>15.03.2018</a:t>
+              <a:t>22.03.2019</a:t>
             </a:fld>
             <a:endParaRPr lang="tr-TR"/>
           </a:p>
@@ -414,10 +412,9 @@
           <a:lstStyle/>
           <a:p>
             <a:r>
-              <a:rPr lang="tr-TR" smtClean="0"/>
+              <a:rPr lang="tr-TR"/>
               <a:t>Asıl başlık stili için tıklatın</a:t>
             </a:r>
-            <a:endParaRPr lang="tr-TR"/>
           </a:p>
         </p:txBody>
       </p:sp>
@@ -438,38 +435,37 @@
           <a:p>
             <a:pPr lvl="0"/>
             <a:r>
-              <a:rPr lang="tr-TR" smtClean="0"/>
+              <a:rPr lang="tr-TR"/>
               <a:t>Asıl metin stillerini düzenlemek için tıklatın</a:t>
             </a:r>
           </a:p>
           <a:p>
             <a:pPr lvl="1"/>
             <a:r>
-              <a:rPr lang="tr-TR" smtClean="0"/>
+              <a:rPr lang="tr-TR"/>
               <a:t>İkinci düzey</a:t>
             </a:r>
           </a:p>
           <a:p>
             <a:pPr lvl="2"/>
             <a:r>
-              <a:rPr lang="tr-TR" smtClean="0"/>
+              <a:rPr lang="tr-TR"/>
               <a:t>Üçüncü düzey</a:t>
             </a:r>
           </a:p>
           <a:p>
             <a:pPr lvl="3"/>
             <a:r>
-              <a:rPr lang="tr-TR" smtClean="0"/>
+              <a:rPr lang="tr-TR"/>
               <a:t>Dördüncü düzey</a:t>
             </a:r>
           </a:p>
           <a:p>
             <a:pPr lvl="4"/>
             <a:r>
-              <a:rPr lang="tr-TR" smtClean="0"/>
+              <a:rPr lang="tr-TR"/>
               <a:t>Beşinci düzey</a:t>
             </a:r>
-            <a:endParaRPr lang="tr-TR"/>
           </a:p>
         </p:txBody>
       </p:sp>
@@ -490,7 +486,7 @@
           <a:p>
             <a:fld id="{C9376674-BA99-403F-8146-953CBF888941}" type="datetimeFigureOut">
               <a:rPr lang="tr-TR" smtClean="0"/>
-              <a:t>15.03.2018</a:t>
+              <a:t>22.03.2019</a:t>
             </a:fld>
             <a:endParaRPr lang="tr-TR"/>
           </a:p>
@@ -589,10 +585,9 @@
           <a:lstStyle/>
           <a:p>
             <a:r>
-              <a:rPr lang="tr-TR" smtClean="0"/>
+              <a:rPr lang="tr-TR"/>
               <a:t>Asıl başlık stili için tıklatın</a:t>
             </a:r>
-            <a:endParaRPr lang="tr-TR"/>
           </a:p>
         </p:txBody>
       </p:sp>
@@ -618,38 +613,37 @@
           <a:p>
             <a:pPr lvl="0"/>
             <a:r>
-              <a:rPr lang="tr-TR" smtClean="0"/>
+              <a:rPr lang="tr-TR"/>
               <a:t>Asıl metin stillerini düzenlemek için tıklatın</a:t>
             </a:r>
           </a:p>
           <a:p>
             <a:pPr lvl="1"/>
             <a:r>
-              <a:rPr lang="tr-TR" smtClean="0"/>
+              <a:rPr lang="tr-TR"/>
               <a:t>İkinci düzey</a:t>
             </a:r>
           </a:p>
           <a:p>
             <a:pPr lvl="2"/>
             <a:r>
-              <a:rPr lang="tr-TR" smtClean="0"/>
+              <a:rPr lang="tr-TR"/>
               <a:t>Üçüncü düzey</a:t>
             </a:r>
           </a:p>
           <a:p>
             <a:pPr lvl="3"/>
             <a:r>
-              <a:rPr lang="tr-TR" smtClean="0"/>
+              <a:rPr lang="tr-TR"/>
               <a:t>Dördüncü düzey</a:t>
             </a:r>
           </a:p>
           <a:p>
             <a:pPr lvl="4"/>
             <a:r>
-              <a:rPr lang="tr-TR" smtClean="0"/>
+              <a:rPr lang="tr-TR"/>
               <a:t>Beşinci düzey</a:t>
             </a:r>
-            <a:endParaRPr lang="tr-TR"/>
           </a:p>
         </p:txBody>
       </p:sp>
@@ -670,7 +664,7 @@
           <a:p>
             <a:fld id="{C9376674-BA99-403F-8146-953CBF888941}" type="datetimeFigureOut">
               <a:rPr lang="tr-TR" smtClean="0"/>
-              <a:t>15.03.2018</a:t>
+              <a:t>22.03.2019</a:t>
             </a:fld>
             <a:endParaRPr lang="tr-TR"/>
           </a:p>
@@ -764,10 +758,9 @@
           <a:lstStyle/>
           <a:p>
             <a:r>
-              <a:rPr lang="tr-TR" smtClean="0"/>
+              <a:rPr lang="tr-TR"/>
               <a:t>Asıl başlık stili için tıklatın</a:t>
             </a:r>
-            <a:endParaRPr lang="tr-TR"/>
           </a:p>
         </p:txBody>
       </p:sp>
@@ -788,38 +781,37 @@
           <a:p>
             <a:pPr lvl="0"/>
             <a:r>
-              <a:rPr lang="tr-TR" smtClean="0"/>
+              <a:rPr lang="tr-TR"/>
               <a:t>Asıl metin stillerini düzenlemek için tıklatın</a:t>
             </a:r>
           </a:p>
           <a:p>
             <a:pPr lvl="1"/>
             <a:r>
-              <a:rPr lang="tr-TR" smtClean="0"/>
+              <a:rPr lang="tr-TR"/>
               <a:t>İkinci düzey</a:t>
             </a:r>
           </a:p>
           <a:p>
             <a:pPr lvl="2"/>
             <a:r>
-              <a:rPr lang="tr-TR" smtClean="0"/>
+              <a:rPr lang="tr-TR"/>
               <a:t>Üçüncü düzey</a:t>
             </a:r>
           </a:p>
           <a:p>
             <a:pPr lvl="3"/>
             <a:r>
-              <a:rPr lang="tr-TR" smtClean="0"/>
+              <a:rPr lang="tr-TR"/>
               <a:t>Dördüncü düzey</a:t>
             </a:r>
           </a:p>
           <a:p>
             <a:pPr lvl="4"/>
             <a:r>
-              <a:rPr lang="tr-TR" smtClean="0"/>
+              <a:rPr lang="tr-TR"/>
               <a:t>Beşinci düzey</a:t>
             </a:r>
-            <a:endParaRPr lang="tr-TR"/>
           </a:p>
         </p:txBody>
       </p:sp>
@@ -840,7 +832,7 @@
           <a:p>
             <a:fld id="{C9376674-BA99-403F-8146-953CBF888941}" type="datetimeFigureOut">
               <a:rPr lang="tr-TR" smtClean="0"/>
-              <a:t>15.03.2018</a:t>
+              <a:t>22.03.2019</a:t>
             </a:fld>
             <a:endParaRPr lang="tr-TR"/>
           </a:p>
@@ -943,10 +935,9 @@
           </a:lstStyle>
           <a:p>
             <a:r>
-              <a:rPr lang="tr-TR" smtClean="0"/>
+              <a:rPr lang="tr-TR"/>
               <a:t>Asıl başlık stili için tıklatın</a:t>
             </a:r>
-            <a:endParaRPr lang="tr-TR"/>
           </a:p>
         </p:txBody>
       </p:sp>
@@ -1063,7 +1054,7 @@
           <a:p>
             <a:pPr lvl="0"/>
             <a:r>
-              <a:rPr lang="tr-TR" smtClean="0"/>
+              <a:rPr lang="tr-TR"/>
               <a:t>Asıl metin stillerini düzenlemek için tıklatın</a:t>
             </a:r>
           </a:p>
@@ -1086,7 +1077,7 @@
           <a:p>
             <a:fld id="{C9376674-BA99-403F-8146-953CBF888941}" type="datetimeFigureOut">
               <a:rPr lang="tr-TR" smtClean="0"/>
-              <a:t>15.03.2018</a:t>
+              <a:t>22.03.2019</a:t>
             </a:fld>
             <a:endParaRPr lang="tr-TR"/>
           </a:p>
@@ -1180,10 +1171,9 @@
           <a:lstStyle/>
           <a:p>
             <a:r>
-              <a:rPr lang="tr-TR" smtClean="0"/>
+              <a:rPr lang="tr-TR"/>
               <a:t>Asıl başlık stili için tıklatın</a:t>
             </a:r>
-            <a:endParaRPr lang="tr-TR"/>
           </a:p>
         </p:txBody>
       </p:sp>
@@ -1237,38 +1227,37 @@
           <a:p>
             <a:pPr lvl="0"/>
             <a:r>
-              <a:rPr lang="tr-TR" smtClean="0"/>
+              <a:rPr lang="tr-TR"/>
               <a:t>Asıl metin stillerini düzenlemek için tıklatın</a:t>
             </a:r>
           </a:p>
           <a:p>
             <a:pPr lvl="1"/>
             <a:r>
-              <a:rPr lang="tr-TR" smtClean="0"/>
+              <a:rPr lang="tr-TR"/>
               <a:t>İkinci düzey</a:t>
             </a:r>
           </a:p>
           <a:p>
             <a:pPr lvl="2"/>
             <a:r>
-              <a:rPr lang="tr-TR" smtClean="0"/>
+              <a:rPr lang="tr-TR"/>
               <a:t>Üçüncü düzey</a:t>
             </a:r>
           </a:p>
           <a:p>
             <a:pPr lvl="3"/>
             <a:r>
-              <a:rPr lang="tr-TR" smtClean="0"/>
+              <a:rPr lang="tr-TR"/>
               <a:t>Dördüncü düzey</a:t>
             </a:r>
           </a:p>
           <a:p>
             <a:pPr lvl="4"/>
             <a:r>
-              <a:rPr lang="tr-TR" smtClean="0"/>
+              <a:rPr lang="tr-TR"/>
               <a:t>Beşinci düzey</a:t>
             </a:r>
-            <a:endParaRPr lang="tr-TR"/>
           </a:p>
         </p:txBody>
       </p:sp>
@@ -1322,38 +1311,37 @@
           <a:p>
             <a:pPr lvl="0"/>
             <a:r>
-              <a:rPr lang="tr-TR" smtClean="0"/>
+              <a:rPr lang="tr-TR"/>
               <a:t>Asıl metin stillerini düzenlemek için tıklatın</a:t>
             </a:r>
           </a:p>
           <a:p>
             <a:pPr lvl="1"/>
             <a:r>
-              <a:rPr lang="tr-TR" smtClean="0"/>
+              <a:rPr lang="tr-TR"/>
               <a:t>İkinci düzey</a:t>
             </a:r>
           </a:p>
           <a:p>
             <a:pPr lvl="2"/>
             <a:r>
-              <a:rPr lang="tr-TR" smtClean="0"/>
+              <a:rPr lang="tr-TR"/>
               <a:t>Üçüncü düzey</a:t>
             </a:r>
           </a:p>
           <a:p>
             <a:pPr lvl="3"/>
             <a:r>
-              <a:rPr lang="tr-TR" smtClean="0"/>
+              <a:rPr lang="tr-TR"/>
               <a:t>Dördüncü düzey</a:t>
             </a:r>
           </a:p>
           <a:p>
             <a:pPr lvl="4"/>
             <a:r>
-              <a:rPr lang="tr-TR" smtClean="0"/>
+              <a:rPr lang="tr-TR"/>
               <a:t>Beşinci düzey</a:t>
             </a:r>
-            <a:endParaRPr lang="tr-TR"/>
           </a:p>
         </p:txBody>
       </p:sp>
@@ -1374,7 +1362,7 @@
           <a:p>
             <a:fld id="{C9376674-BA99-403F-8146-953CBF888941}" type="datetimeFigureOut">
               <a:rPr lang="tr-TR" smtClean="0"/>
-              <a:t>15.03.2018</a:t>
+              <a:t>22.03.2019</a:t>
             </a:fld>
             <a:endParaRPr lang="tr-TR"/>
           </a:p>
@@ -1472,10 +1460,9 @@
           </a:lstStyle>
           <a:p>
             <a:r>
-              <a:rPr lang="tr-TR" smtClean="0"/>
+              <a:rPr lang="tr-TR"/>
               <a:t>Asıl başlık stili için tıklatın</a:t>
             </a:r>
-            <a:endParaRPr lang="tr-TR"/>
           </a:p>
         </p:txBody>
       </p:sp>
@@ -1538,7 +1525,7 @@
           <a:p>
             <a:pPr lvl="0"/>
             <a:r>
-              <a:rPr lang="tr-TR" smtClean="0"/>
+              <a:rPr lang="tr-TR"/>
               <a:t>Asıl metin stillerini düzenlemek için tıklatın</a:t>
             </a:r>
           </a:p>
@@ -1594,38 +1581,37 @@
           <a:p>
             <a:pPr lvl="0"/>
             <a:r>
-              <a:rPr lang="tr-TR" smtClean="0"/>
+              <a:rPr lang="tr-TR"/>
               <a:t>Asıl metin stillerini düzenlemek için tıklatın</a:t>
             </a:r>
           </a:p>
           <a:p>
             <a:pPr lvl="1"/>
             <a:r>
-              <a:rPr lang="tr-TR" smtClean="0"/>
+              <a:rPr lang="tr-TR"/>
               <a:t>İkinci düzey</a:t>
             </a:r>
           </a:p>
           <a:p>
             <a:pPr lvl="2"/>
             <a:r>
-              <a:rPr lang="tr-TR" smtClean="0"/>
+              <a:rPr lang="tr-TR"/>
               <a:t>Üçüncü düzey</a:t>
             </a:r>
           </a:p>
           <a:p>
             <a:pPr lvl="3"/>
             <a:r>
-              <a:rPr lang="tr-TR" smtClean="0"/>
+              <a:rPr lang="tr-TR"/>
               <a:t>Dördüncü düzey</a:t>
             </a:r>
           </a:p>
           <a:p>
             <a:pPr lvl="4"/>
             <a:r>
-              <a:rPr lang="tr-TR" smtClean="0"/>
+              <a:rPr lang="tr-TR"/>
               <a:t>Beşinci düzey</a:t>
             </a:r>
-            <a:endParaRPr lang="tr-TR"/>
           </a:p>
         </p:txBody>
       </p:sp>
@@ -1688,7 +1674,7 @@
           <a:p>
             <a:pPr lvl="0"/>
             <a:r>
-              <a:rPr lang="tr-TR" smtClean="0"/>
+              <a:rPr lang="tr-TR"/>
               <a:t>Asıl metin stillerini düzenlemek için tıklatın</a:t>
             </a:r>
           </a:p>
@@ -1744,38 +1730,37 @@
           <a:p>
             <a:pPr lvl="0"/>
             <a:r>
-              <a:rPr lang="tr-TR" smtClean="0"/>
+              <a:rPr lang="tr-TR"/>
               <a:t>Asıl metin stillerini düzenlemek için tıklatın</a:t>
             </a:r>
           </a:p>
           <a:p>
             <a:pPr lvl="1"/>
             <a:r>
-              <a:rPr lang="tr-TR" smtClean="0"/>
+              <a:rPr lang="tr-TR"/>
               <a:t>İkinci düzey</a:t>
             </a:r>
           </a:p>
           <a:p>
             <a:pPr lvl="2"/>
             <a:r>
-              <a:rPr lang="tr-TR" smtClean="0"/>
+              <a:rPr lang="tr-TR"/>
               <a:t>Üçüncü düzey</a:t>
             </a:r>
           </a:p>
           <a:p>
             <a:pPr lvl="3"/>
             <a:r>
-              <a:rPr lang="tr-TR" smtClean="0"/>
+              <a:rPr lang="tr-TR"/>
               <a:t>Dördüncü düzey</a:t>
             </a:r>
           </a:p>
           <a:p>
             <a:pPr lvl="4"/>
             <a:r>
-              <a:rPr lang="tr-TR" smtClean="0"/>
+              <a:rPr lang="tr-TR"/>
               <a:t>Beşinci düzey</a:t>
             </a:r>
-            <a:endParaRPr lang="tr-TR"/>
           </a:p>
         </p:txBody>
       </p:sp>
@@ -1796,7 +1781,7 @@
           <a:p>
             <a:fld id="{C9376674-BA99-403F-8146-953CBF888941}" type="datetimeFigureOut">
               <a:rPr lang="tr-TR" smtClean="0"/>
-              <a:t>15.03.2018</a:t>
+              <a:t>22.03.2019</a:t>
             </a:fld>
             <a:endParaRPr lang="tr-TR"/>
           </a:p>
@@ -1890,10 +1875,9 @@
           <a:lstStyle/>
           <a:p>
             <a:r>
-              <a:rPr lang="tr-TR" smtClean="0"/>
+              <a:rPr lang="tr-TR"/>
               <a:t>Asıl başlık stili için tıklatın</a:t>
             </a:r>
-            <a:endParaRPr lang="tr-TR"/>
           </a:p>
         </p:txBody>
       </p:sp>
@@ -1914,7 +1898,7 @@
           <a:p>
             <a:fld id="{C9376674-BA99-403F-8146-953CBF888941}" type="datetimeFigureOut">
               <a:rPr lang="tr-TR" smtClean="0"/>
-              <a:t>15.03.2018</a:t>
+              <a:t>22.03.2019</a:t>
             </a:fld>
             <a:endParaRPr lang="tr-TR"/>
           </a:p>
@@ -2009,7 +1993,7 @@
           <a:p>
             <a:fld id="{C9376674-BA99-403F-8146-953CBF888941}" type="datetimeFigureOut">
               <a:rPr lang="tr-TR" smtClean="0"/>
-              <a:t>15.03.2018</a:t>
+              <a:t>22.03.2019</a:t>
             </a:fld>
             <a:endParaRPr lang="tr-TR"/>
           </a:p>
@@ -2112,10 +2096,9 @@
           </a:lstStyle>
           <a:p>
             <a:r>
-              <a:rPr lang="tr-TR" smtClean="0"/>
+              <a:rPr lang="tr-TR"/>
               <a:t>Asıl başlık stili için tıklatın</a:t>
             </a:r>
-            <a:endParaRPr lang="tr-TR"/>
           </a:p>
         </p:txBody>
       </p:sp>
@@ -2169,38 +2152,37 @@
           <a:p>
             <a:pPr lvl="0"/>
             <a:r>
-              <a:rPr lang="tr-TR" smtClean="0"/>
+              <a:rPr lang="tr-TR"/>
               <a:t>Asıl metin stillerini düzenlemek için tıklatın</a:t>
             </a:r>
           </a:p>
           <a:p>
             <a:pPr lvl="1"/>
             <a:r>
-              <a:rPr lang="tr-TR" smtClean="0"/>
+              <a:rPr lang="tr-TR"/>
               <a:t>İkinci düzey</a:t>
             </a:r>
           </a:p>
           <a:p>
             <a:pPr lvl="2"/>
             <a:r>
-              <a:rPr lang="tr-TR" smtClean="0"/>
+              <a:rPr lang="tr-TR"/>
               <a:t>Üçüncü düzey</a:t>
             </a:r>
           </a:p>
           <a:p>
             <a:pPr lvl="3"/>
             <a:r>
-              <a:rPr lang="tr-TR" smtClean="0"/>
+              <a:rPr lang="tr-TR"/>
               <a:t>Dördüncü düzey</a:t>
             </a:r>
           </a:p>
           <a:p>
             <a:pPr lvl="4"/>
             <a:r>
-              <a:rPr lang="tr-TR" smtClean="0"/>
+              <a:rPr lang="tr-TR"/>
               <a:t>Beşinci düzey</a:t>
             </a:r>
-            <a:endParaRPr lang="tr-TR"/>
           </a:p>
         </p:txBody>
       </p:sp>
@@ -2263,7 +2245,7 @@
           <a:p>
             <a:pPr lvl="0"/>
             <a:r>
-              <a:rPr lang="tr-TR" smtClean="0"/>
+              <a:rPr lang="tr-TR"/>
               <a:t>Asıl metin stillerini düzenlemek için tıklatın</a:t>
             </a:r>
           </a:p>
@@ -2286,7 +2268,7 @@
           <a:p>
             <a:fld id="{C9376674-BA99-403F-8146-953CBF888941}" type="datetimeFigureOut">
               <a:rPr lang="tr-TR" smtClean="0"/>
-              <a:t>15.03.2018</a:t>
+              <a:t>22.03.2019</a:t>
             </a:fld>
             <a:endParaRPr lang="tr-TR"/>
           </a:p>
@@ -2389,10 +2371,9 @@
           </a:lstStyle>
           <a:p>
             <a:r>
-              <a:rPr lang="tr-TR" smtClean="0"/>
+              <a:rPr lang="tr-TR"/>
               <a:t>Asıl başlık stili için tıklatın</a:t>
             </a:r>
-            <a:endParaRPr lang="tr-TR"/>
           </a:p>
         </p:txBody>
       </p:sp>
@@ -2516,7 +2497,7 @@
           <a:p>
             <a:pPr lvl="0"/>
             <a:r>
-              <a:rPr lang="tr-TR" smtClean="0"/>
+              <a:rPr lang="tr-TR"/>
               <a:t>Asıl metin stillerini düzenlemek için tıklatın</a:t>
             </a:r>
           </a:p>
@@ -2539,7 +2520,7 @@
           <a:p>
             <a:fld id="{C9376674-BA99-403F-8146-953CBF888941}" type="datetimeFigureOut">
               <a:rPr lang="tr-TR" smtClean="0"/>
-              <a:t>15.03.2018</a:t>
+              <a:t>22.03.2019</a:t>
             </a:fld>
             <a:endParaRPr lang="tr-TR"/>
           </a:p>
@@ -2648,10 +2629,9 @@
           <a:lstStyle/>
           <a:p>
             <a:r>
-              <a:rPr lang="tr-TR" smtClean="0"/>
+              <a:rPr lang="tr-TR"/>
               <a:t>Asıl başlık stili için tıklatın</a:t>
             </a:r>
-            <a:endParaRPr lang="tr-TR"/>
           </a:p>
         </p:txBody>
       </p:sp>
@@ -2682,38 +2662,37 @@
           <a:p>
             <a:pPr lvl="0"/>
             <a:r>
-              <a:rPr lang="tr-TR" smtClean="0"/>
+              <a:rPr lang="tr-TR"/>
               <a:t>Asıl metin stillerini düzenlemek için tıklatın</a:t>
             </a:r>
           </a:p>
           <a:p>
             <a:pPr lvl="1"/>
             <a:r>
-              <a:rPr lang="tr-TR" smtClean="0"/>
+              <a:rPr lang="tr-TR"/>
               <a:t>İkinci düzey</a:t>
             </a:r>
           </a:p>
           <a:p>
             <a:pPr lvl="2"/>
             <a:r>
-              <a:rPr lang="tr-TR" smtClean="0"/>
+              <a:rPr lang="tr-TR"/>
               <a:t>Üçüncü düzey</a:t>
             </a:r>
           </a:p>
           <a:p>
             <a:pPr lvl="3"/>
             <a:r>
-              <a:rPr lang="tr-TR" smtClean="0"/>
+              <a:rPr lang="tr-TR"/>
               <a:t>Dördüncü düzey</a:t>
             </a:r>
           </a:p>
           <a:p>
             <a:pPr lvl="4"/>
             <a:r>
-              <a:rPr lang="tr-TR" smtClean="0"/>
+              <a:rPr lang="tr-TR"/>
               <a:t>Beşinci düzey</a:t>
             </a:r>
-            <a:endParaRPr lang="tr-TR"/>
           </a:p>
         </p:txBody>
       </p:sp>
@@ -2752,7 +2731,7 @@
           <a:p>
             <a:fld id="{C9376674-BA99-403F-8146-953CBF888941}" type="datetimeFigureOut">
               <a:rPr lang="tr-TR" smtClean="0"/>
-              <a:t>15.03.2018</a:t>
+              <a:t>22.03.2019</a:t>
             </a:fld>
             <a:endParaRPr lang="tr-TR"/>
           </a:p>
@@ -3143,10 +3122,9 @@
           <a:lstStyle/>
           <a:p>
             <a:r>
-              <a:rPr lang="tr-TR" dirty="0" smtClean="0"/>
+              <a:rPr lang="tr-TR" dirty="0"/>
               <a:t>UYGULAMA-2</a:t>
             </a:r>
-            <a:endParaRPr lang="tr-TR" dirty="0"/>
           </a:p>
         </p:txBody>
       </p:sp>
@@ -3166,18 +3144,13 @@
           <a:lstStyle/>
           <a:p>
             <a:r>
-              <a:rPr lang="tr-TR" b="1" dirty="0" smtClean="0">
+              <a:rPr lang="tr-TR" b="1" dirty="0">
                 <a:solidFill>
                   <a:schemeClr val="tx1"/>
                 </a:solidFill>
               </a:rPr>
               <a:t>Bilgisayar    Mimarisi</a:t>
             </a:r>
-            <a:endParaRPr lang="tr-TR" b="1" dirty="0">
-              <a:solidFill>
-                <a:schemeClr val="tx1"/>
-              </a:solidFill>
-            </a:endParaRPr>
           </a:p>
         </p:txBody>
       </p:sp>
@@ -3191,13 +3164,6 @@
   <p:clrMapOvr>
     <a:masterClrMapping/>
   </p:clrMapOvr>
-  <p:timing>
-    <p:tnLst>
-      <p:par>
-        <p:cTn id="1" dur="indefinite" restart="never" nodeType="tmRoot"/>
-      </p:par>
-    </p:tnLst>
-  </p:timing>
 </p:sld>
 </file>
 
@@ -3760,28 +3726,16 @@
                   <a:srgbClr val="FF0000"/>
                 </a:solidFill>
               </a:rPr>
-              <a:t>SORU </a:t>
-            </a:r>
-            <a:r>
-              <a:rPr lang="tr-TR" b="1" dirty="0" smtClean="0">
-                <a:solidFill>
-                  <a:srgbClr val="FF0000"/>
-                </a:solidFill>
-              </a:rPr>
-              <a:t>—</a:t>
-            </a:r>
-          </a:p>
-          <a:p>
-            <a:endParaRPr lang="tr-TR" dirty="0" smtClean="0"/>
-          </a:p>
-          <a:p>
-            <a:r>
-              <a:rPr lang="tr-TR" sz="2000" dirty="0" smtClean="0"/>
-              <a:t>Aşağıdaki </a:t>
-            </a:r>
+              <a:t>SORU —</a:t>
+            </a:r>
+          </a:p>
+          <a:p>
+            <a:endParaRPr lang="tr-TR" dirty="0"/>
+          </a:p>
+          <a:p>
             <a:r>
               <a:rPr lang="tr-TR" sz="2000" dirty="0"/>
-              <a:t>MIPS programının amacını komutlara açıklama (</a:t>
+              <a:t>Aşağıdaki MIPS programının amacını komutlara açıklama (</a:t>
             </a:r>
             <a:r>
               <a:rPr lang="tr-TR" sz="2000" dirty="0" err="1"/>
@@ -3793,11 +3747,11 @@
             </a:r>
           </a:p>
           <a:p>
-            <a:endParaRPr lang="tr-TR" sz="2000" dirty="0" smtClean="0"/>
-          </a:p>
-          <a:p>
-            <a:r>
-              <a:rPr lang="tr-TR" sz="2000" dirty="0" smtClean="0"/>
+            <a:endParaRPr lang="tr-TR" sz="2000" dirty="0"/>
+          </a:p>
+          <a:p>
+            <a:r>
+              <a:rPr lang="tr-TR" sz="2000" dirty="0"/>
               <a:t>a0  </a:t>
             </a:r>
             <a:r>
@@ -3899,13 +3853,6 @@
   <p:clrMapOvr>
     <a:masterClrMapping/>
   </p:clrMapOvr>
-  <p:timing>
-    <p:tnLst>
-      <p:par>
-        <p:cTn id="1" dur="indefinite" restart="never" nodeType="tmRoot"/>
-      </p:par>
-    </p:tnLst>
-  </p:timing>
 </p:sld>
 </file>
 
@@ -4000,13 +3947,6 @@
   <p:clrMapOvr>
     <a:masterClrMapping/>
   </p:clrMapOvr>
-  <p:timing>
-    <p:tnLst>
-      <p:par>
-        <p:cTn id="1" dur="indefinite" restart="never" nodeType="tmRoot"/>
-      </p:par>
-    </p:tnLst>
-  </p:timing>
 </p:sld>
 </file>
 
@@ -4101,13 +4041,6 @@
   <p:clrMapOvr>
     <a:masterClrMapping/>
   </p:clrMapOvr>
-  <p:timing>
-    <p:tnLst>
-      <p:par>
-        <p:cTn id="1" dur="indefinite" restart="never" nodeType="tmRoot"/>
-      </p:par>
-    </p:tnLst>
-  </p:timing>
 </p:sld>
 </file>
 
@@ -4202,13 +4135,6 @@
   <p:clrMapOvr>
     <a:masterClrMapping/>
   </p:clrMapOvr>
-  <p:timing>
-    <p:tnLst>
-      <p:par>
-        <p:cTn id="1" dur="indefinite" restart="never" nodeType="tmRoot"/>
-      </p:par>
-    </p:tnLst>
-  </p:timing>
 </p:sld>
 </file>
 
@@ -4252,7 +4178,7 @@
         </p:blipFill>
         <p:spPr bwMode="auto">
           <a:xfrm>
-            <a:off x="468313" y="188913"/>
+            <a:off x="359569" y="260648"/>
             <a:ext cx="8424862" cy="6510337"/>
           </a:xfrm>
           <a:prstGeom prst="rect">
@@ -4413,15 +4339,15 @@
           <a:lstStyle/>
           <a:p>
             <a:r>
-              <a:rPr lang="tr-TR" dirty="0" err="1" smtClean="0"/>
+              <a:rPr lang="tr-TR" dirty="0" err="1"/>
               <a:t>Instruction</a:t>
             </a:r>
             <a:r>
-              <a:rPr lang="tr-TR" dirty="0" smtClean="0"/>
+              <a:rPr lang="tr-TR" dirty="0"/>
               <a:t> </a:t>
             </a:r>
             <a:r>
-              <a:rPr lang="tr-TR" dirty="0" err="1" smtClean="0"/>
+              <a:rPr lang="tr-TR" dirty="0" err="1"/>
               <a:t>Formats</a:t>
             </a:r>
             <a:endParaRPr lang="tr-TR" dirty="0"/>
@@ -4641,7 +4567,7 @@
               <a:tabLst/>
               <a:defRPr/>
             </a:pPr>
-            <a:endParaRPr kumimoji="0" lang="tr-TR" altLang="tr-TR" sz="2000" b="0" i="0" u="none" strike="noStrike" kern="0" cap="none" spc="0" normalizeH="0" baseline="0" noProof="0" dirty="0" smtClean="0">
+            <a:endParaRPr kumimoji="0" lang="tr-TR" altLang="tr-TR" sz="2000" b="0" i="0" u="none" strike="noStrike" kern="0" cap="none" spc="0" normalizeH="0" baseline="0" noProof="0" dirty="0">
               <a:ln>
                 <a:noFill/>
               </a:ln>
@@ -4672,7 +4598,7 @@
               <a:defRPr/>
             </a:pPr>
             <a:r>
-              <a:rPr kumimoji="0" lang="en-US" altLang="tr-TR" sz="2000" b="0" i="0" u="none" strike="noStrike" kern="0" cap="none" spc="0" normalizeH="0" baseline="0" noProof="0" dirty="0" smtClean="0">
+              <a:rPr kumimoji="0" lang="en-US" altLang="tr-TR" sz="2000" b="0" i="0" u="none" strike="noStrike" kern="0" cap="none" spc="0" normalizeH="0" baseline="0" noProof="0" dirty="0">
                 <a:ln>
                   <a:noFill/>
                 </a:ln>
@@ -4687,7 +4613,7 @@
               <a:t>R-type (6-bit </a:t>
             </a:r>
             <a:r>
-              <a:rPr kumimoji="0" lang="en-US" altLang="tr-TR" sz="2000" b="0" i="0" u="none" strike="noStrike" kern="0" cap="none" spc="0" normalizeH="0" baseline="0" noProof="0" dirty="0" err="1" smtClean="0">
+              <a:rPr kumimoji="0" lang="en-US" altLang="tr-TR" sz="2000" b="0" i="0" u="none" strike="noStrike" kern="0" cap="none" spc="0" normalizeH="0" baseline="0" noProof="0" dirty="0" err="1">
                 <a:ln>
                   <a:noFill/>
                 </a:ln>
@@ -4702,7 +4628,7 @@
               <a:t>opcode</a:t>
             </a:r>
             <a:r>
-              <a:rPr kumimoji="0" lang="en-US" altLang="tr-TR" sz="2000" b="0" i="0" u="none" strike="noStrike" kern="0" cap="none" spc="0" normalizeH="0" baseline="0" noProof="0" dirty="0" smtClean="0">
+              <a:rPr kumimoji="0" lang="en-US" altLang="tr-TR" sz="2000" b="0" i="0" u="none" strike="noStrike" kern="0" cap="none" spc="0" normalizeH="0" baseline="0" noProof="0" dirty="0">
                 <a:ln>
                   <a:noFill/>
                 </a:ln>
@@ -4717,7 +4643,7 @@
               <a:t>, 5-bit </a:t>
             </a:r>
             <a:r>
-              <a:rPr kumimoji="0" lang="en-US" altLang="tr-TR" sz="2000" b="0" i="0" u="none" strike="noStrike" kern="0" cap="none" spc="0" normalizeH="0" baseline="0" noProof="0" dirty="0" err="1" smtClean="0">
+              <a:rPr kumimoji="0" lang="en-US" altLang="tr-TR" sz="2000" b="0" i="0" u="none" strike="noStrike" kern="0" cap="none" spc="0" normalizeH="0" baseline="0" noProof="0" dirty="0" err="1">
                 <a:ln>
                   <a:noFill/>
                 </a:ln>
@@ -4732,7 +4658,7 @@
               <a:t>rs</a:t>
             </a:r>
             <a:r>
-              <a:rPr kumimoji="0" lang="en-US" altLang="tr-TR" sz="2000" b="0" i="0" u="none" strike="noStrike" kern="0" cap="none" spc="0" normalizeH="0" baseline="0" noProof="0" dirty="0" smtClean="0">
+              <a:rPr kumimoji="0" lang="en-US" altLang="tr-TR" sz="2000" b="0" i="0" u="none" strike="noStrike" kern="0" cap="none" spc="0" normalizeH="0" baseline="0" noProof="0" dirty="0">
                 <a:ln>
                   <a:noFill/>
                 </a:ln>
@@ -4747,7 +4673,7 @@
               <a:t>, 5-bit </a:t>
             </a:r>
             <a:r>
-              <a:rPr kumimoji="0" lang="en-US" altLang="tr-TR" sz="2000" b="0" i="0" u="none" strike="noStrike" kern="0" cap="none" spc="0" normalizeH="0" baseline="0" noProof="0" dirty="0" err="1" smtClean="0">
+              <a:rPr kumimoji="0" lang="en-US" altLang="tr-TR" sz="2000" b="0" i="0" u="none" strike="noStrike" kern="0" cap="none" spc="0" normalizeH="0" baseline="0" noProof="0" dirty="0" err="1">
                 <a:ln>
                   <a:noFill/>
                 </a:ln>
@@ -4762,7 +4688,7 @@
               <a:t>rt</a:t>
             </a:r>
             <a:r>
-              <a:rPr kumimoji="0" lang="en-US" altLang="tr-TR" sz="2000" b="0" i="0" u="none" strike="noStrike" kern="0" cap="none" spc="0" normalizeH="0" baseline="0" noProof="0" dirty="0" smtClean="0">
+              <a:rPr kumimoji="0" lang="en-US" altLang="tr-TR" sz="2000" b="0" i="0" u="none" strike="noStrike" kern="0" cap="none" spc="0" normalizeH="0" baseline="0" noProof="0" dirty="0">
                 <a:ln>
                   <a:noFill/>
                 </a:ln>
@@ -4777,7 +4703,7 @@
               <a:t>, 5-bit </a:t>
             </a:r>
             <a:r>
-              <a:rPr kumimoji="0" lang="en-US" altLang="tr-TR" sz="2000" b="0" i="0" u="none" strike="noStrike" kern="0" cap="none" spc="0" normalizeH="0" baseline="0" noProof="0" dirty="0" err="1" smtClean="0">
+              <a:rPr kumimoji="0" lang="en-US" altLang="tr-TR" sz="2000" b="0" i="0" u="none" strike="noStrike" kern="0" cap="none" spc="0" normalizeH="0" baseline="0" noProof="0" dirty="0" err="1">
                 <a:ln>
                   <a:noFill/>
                 </a:ln>
@@ -4792,7 +4718,7 @@
               <a:t>rd</a:t>
             </a:r>
             <a:r>
-              <a:rPr kumimoji="0" lang="en-US" altLang="tr-TR" sz="2000" b="0" i="0" u="none" strike="noStrike" kern="0" cap="none" spc="0" normalizeH="0" baseline="0" noProof="0" dirty="0" smtClean="0">
+              <a:rPr kumimoji="0" lang="en-US" altLang="tr-TR" sz="2000" b="0" i="0" u="none" strike="noStrike" kern="0" cap="none" spc="0" normalizeH="0" baseline="0" noProof="0" dirty="0">
                 <a:ln>
                   <a:noFill/>
                 </a:ln>
@@ -4807,7 +4733,7 @@
               <a:t>, 5-bit </a:t>
             </a:r>
             <a:r>
-              <a:rPr kumimoji="0" lang="en-US" altLang="tr-TR" sz="2000" b="0" i="0" u="none" strike="noStrike" kern="0" cap="none" spc="0" normalizeH="0" baseline="0" noProof="0" dirty="0" err="1" smtClean="0">
+              <a:rPr kumimoji="0" lang="en-US" altLang="tr-TR" sz="2000" b="0" i="0" u="none" strike="noStrike" kern="0" cap="none" spc="0" normalizeH="0" baseline="0" noProof="0" dirty="0" err="1">
                 <a:ln>
                   <a:noFill/>
                 </a:ln>
@@ -4822,7 +4748,7 @@
               <a:t>shamt</a:t>
             </a:r>
             <a:r>
-              <a:rPr kumimoji="0" lang="en-US" altLang="tr-TR" sz="2000" b="0" i="0" u="none" strike="noStrike" kern="0" cap="none" spc="0" normalizeH="0" baseline="0" noProof="0" dirty="0" smtClean="0">
+              <a:rPr kumimoji="0" lang="en-US" altLang="tr-TR" sz="2000" b="0" i="0" u="none" strike="noStrike" kern="0" cap="none" spc="0" normalizeH="0" baseline="0" noProof="0" dirty="0">
                 <a:ln>
                   <a:noFill/>
                 </a:ln>
@@ -4855,7 +4781,7 @@
               <a:tabLst/>
               <a:defRPr/>
             </a:pPr>
-            <a:endParaRPr kumimoji="0" lang="en-US" altLang="tr-TR" sz="2000" b="0" i="0" u="none" strike="noStrike" kern="0" cap="none" spc="0" normalizeH="0" baseline="0" noProof="0" dirty="0" smtClean="0">
+            <a:endParaRPr kumimoji="0" lang="en-US" altLang="tr-TR" sz="2000" b="0" i="0" u="none" strike="noStrike" kern="0" cap="none" spc="0" normalizeH="0" baseline="0" noProof="0" dirty="0">
               <a:ln>
                 <a:noFill/>
               </a:ln>
@@ -4886,7 +4812,7 @@
               <a:tabLst/>
               <a:defRPr/>
             </a:pPr>
-            <a:endParaRPr kumimoji="0" lang="tr-TR" altLang="tr-TR" sz="2000" b="0" i="0" u="none" strike="noStrike" kern="0" cap="none" spc="0" normalizeH="0" baseline="0" noProof="0" dirty="0" smtClean="0">
+            <a:endParaRPr kumimoji="0" lang="tr-TR" altLang="tr-TR" sz="2000" b="0" i="0" u="none" strike="noStrike" kern="0" cap="none" spc="0" normalizeH="0" baseline="0" noProof="0" dirty="0">
               <a:ln>
                 <a:noFill/>
               </a:ln>
@@ -4917,7 +4843,7 @@
               <a:tabLst/>
               <a:defRPr/>
             </a:pPr>
-            <a:endParaRPr kumimoji="0" lang="en-US" altLang="tr-TR" sz="2000" b="0" i="0" u="none" strike="noStrike" kern="0" cap="none" spc="0" normalizeH="0" baseline="0" noProof="0" dirty="0" smtClean="0">
+            <a:endParaRPr kumimoji="0" lang="en-US" altLang="tr-TR" sz="2000" b="0" i="0" u="none" strike="noStrike" kern="0" cap="none" spc="0" normalizeH="0" baseline="0" noProof="0" dirty="0">
               <a:ln>
                 <a:noFill/>
               </a:ln>
@@ -4949,7 +4875,7 @@
               <a:defRPr/>
             </a:pPr>
             <a:r>
-              <a:rPr kumimoji="0" lang="en-US" altLang="tr-TR" sz="2000" b="0" i="0" u="none" strike="noStrike" kern="0" cap="none" spc="0" normalizeH="0" baseline="0" noProof="0" dirty="0" smtClean="0">
+              <a:rPr kumimoji="0" lang="en-US" altLang="tr-TR" sz="2000" b="0" i="0" u="none" strike="noStrike" kern="0" cap="none" spc="0" normalizeH="0" baseline="0" noProof="0" dirty="0">
                 <a:ln>
                   <a:noFill/>
                 </a:ln>
@@ -4964,7 +4890,7 @@
               <a:t>I-type (6-bit </a:t>
             </a:r>
             <a:r>
-              <a:rPr kumimoji="0" lang="en-US" altLang="tr-TR" sz="2000" b="0" i="0" u="none" strike="noStrike" kern="0" cap="none" spc="0" normalizeH="0" baseline="0" noProof="0" dirty="0" err="1" smtClean="0">
+              <a:rPr kumimoji="0" lang="en-US" altLang="tr-TR" sz="2000" b="0" i="0" u="none" strike="noStrike" kern="0" cap="none" spc="0" normalizeH="0" baseline="0" noProof="0" dirty="0" err="1">
                 <a:ln>
                   <a:noFill/>
                 </a:ln>
@@ -4979,7 +4905,7 @@
               <a:t>opcode</a:t>
             </a:r>
             <a:r>
-              <a:rPr kumimoji="0" lang="en-US" altLang="tr-TR" sz="2000" b="0" i="0" u="none" strike="noStrike" kern="0" cap="none" spc="0" normalizeH="0" baseline="0" noProof="0" dirty="0" smtClean="0">
+              <a:rPr kumimoji="0" lang="en-US" altLang="tr-TR" sz="2000" b="0" i="0" u="none" strike="noStrike" kern="0" cap="none" spc="0" normalizeH="0" baseline="0" noProof="0" dirty="0">
                 <a:ln>
                   <a:noFill/>
                 </a:ln>
@@ -4994,7 +4920,7 @@
               <a:t>, 5-bit </a:t>
             </a:r>
             <a:r>
-              <a:rPr kumimoji="0" lang="en-US" altLang="tr-TR" sz="2000" b="0" i="0" u="none" strike="noStrike" kern="0" cap="none" spc="0" normalizeH="0" baseline="0" noProof="0" dirty="0" err="1" smtClean="0">
+              <a:rPr kumimoji="0" lang="en-US" altLang="tr-TR" sz="2000" b="0" i="0" u="none" strike="noStrike" kern="0" cap="none" spc="0" normalizeH="0" baseline="0" noProof="0" dirty="0" err="1">
                 <a:ln>
                   <a:noFill/>
                 </a:ln>
@@ -5009,7 +4935,7 @@
               <a:t>rs</a:t>
             </a:r>
             <a:r>
-              <a:rPr kumimoji="0" lang="en-US" altLang="tr-TR" sz="2000" b="0" i="0" u="none" strike="noStrike" kern="0" cap="none" spc="0" normalizeH="0" baseline="0" noProof="0" dirty="0" smtClean="0">
+              <a:rPr kumimoji="0" lang="en-US" altLang="tr-TR" sz="2000" b="0" i="0" u="none" strike="noStrike" kern="0" cap="none" spc="0" normalizeH="0" baseline="0" noProof="0" dirty="0">
                 <a:ln>
                   <a:noFill/>
                 </a:ln>
@@ -5024,7 +4950,7 @@
               <a:t>, 5-bit </a:t>
             </a:r>
             <a:r>
-              <a:rPr kumimoji="0" lang="en-US" altLang="tr-TR" sz="2000" b="0" i="0" u="none" strike="noStrike" kern="0" cap="none" spc="0" normalizeH="0" baseline="0" noProof="0" dirty="0" err="1" smtClean="0">
+              <a:rPr kumimoji="0" lang="en-US" altLang="tr-TR" sz="2000" b="0" i="0" u="none" strike="noStrike" kern="0" cap="none" spc="0" normalizeH="0" baseline="0" noProof="0" dirty="0" err="1">
                 <a:ln>
                   <a:noFill/>
                 </a:ln>
@@ -5039,7 +4965,7 @@
               <a:t>rt</a:t>
             </a:r>
             <a:r>
-              <a:rPr kumimoji="0" lang="en-US" altLang="tr-TR" sz="2000" b="0" i="0" u="none" strike="noStrike" kern="0" cap="none" spc="0" normalizeH="0" baseline="0" noProof="0" dirty="0" smtClean="0">
+              <a:rPr kumimoji="0" lang="en-US" altLang="tr-TR" sz="2000" b="0" i="0" u="none" strike="noStrike" kern="0" cap="none" spc="0" normalizeH="0" baseline="0" noProof="0" dirty="0">
                 <a:ln>
                   <a:noFill/>
                 </a:ln>
@@ -5072,7 +4998,7 @@
               <a:tabLst/>
               <a:defRPr/>
             </a:pPr>
-            <a:endParaRPr kumimoji="0" lang="en-US" altLang="tr-TR" sz="2000" b="0" i="0" u="none" strike="noStrike" kern="0" cap="none" spc="0" normalizeH="0" baseline="0" noProof="0" dirty="0" smtClean="0">
+            <a:endParaRPr kumimoji="0" lang="en-US" altLang="tr-TR" sz="2000" b="0" i="0" u="none" strike="noStrike" kern="0" cap="none" spc="0" normalizeH="0" baseline="0" noProof="0" dirty="0">
               <a:ln>
                 <a:noFill/>
               </a:ln>
@@ -5103,7 +5029,7 @@
               <a:tabLst/>
               <a:defRPr/>
             </a:pPr>
-            <a:endParaRPr kumimoji="0" lang="tr-TR" altLang="tr-TR" sz="2000" b="0" i="0" u="none" strike="noStrike" kern="0" cap="none" spc="0" normalizeH="0" baseline="0" noProof="0" dirty="0" smtClean="0">
+            <a:endParaRPr kumimoji="0" lang="tr-TR" altLang="tr-TR" sz="2000" b="0" i="0" u="none" strike="noStrike" kern="0" cap="none" spc="0" normalizeH="0" baseline="0" noProof="0" dirty="0">
               <a:ln>
                 <a:noFill/>
               </a:ln>
@@ -5134,7 +5060,7 @@
               <a:tabLst/>
               <a:defRPr/>
             </a:pPr>
-            <a:endParaRPr kumimoji="0" lang="en-US" altLang="tr-TR" sz="2000" b="0" i="0" u="none" strike="noStrike" kern="0" cap="none" spc="0" normalizeH="0" baseline="0" noProof="0" dirty="0" smtClean="0">
+            <a:endParaRPr kumimoji="0" lang="en-US" altLang="tr-TR" sz="2000" b="0" i="0" u="none" strike="noStrike" kern="0" cap="none" spc="0" normalizeH="0" baseline="0" noProof="0" dirty="0">
               <a:ln>
                 <a:noFill/>
               </a:ln>
@@ -5166,7 +5092,7 @@
               <a:defRPr/>
             </a:pPr>
             <a:r>
-              <a:rPr kumimoji="0" lang="en-US" altLang="tr-TR" sz="2000" b="0" i="0" u="none" strike="noStrike" kern="0" cap="none" spc="0" normalizeH="0" baseline="0" noProof="0" dirty="0" smtClean="0">
+              <a:rPr kumimoji="0" lang="en-US" altLang="tr-TR" sz="2000" b="0" i="0" u="none" strike="noStrike" kern="0" cap="none" spc="0" normalizeH="0" baseline="0" noProof="0" dirty="0">
                 <a:ln>
                   <a:noFill/>
                 </a:ln>
@@ -5181,7 +5107,7 @@
               <a:t>J-type (6-bit </a:t>
             </a:r>
             <a:r>
-              <a:rPr kumimoji="0" lang="en-US" altLang="tr-TR" sz="2000" b="0" i="0" u="none" strike="noStrike" kern="0" cap="none" spc="0" normalizeH="0" baseline="0" noProof="0" dirty="0" err="1" smtClean="0">
+              <a:rPr kumimoji="0" lang="en-US" altLang="tr-TR" sz="2000" b="0" i="0" u="none" strike="noStrike" kern="0" cap="none" spc="0" normalizeH="0" baseline="0" noProof="0" dirty="0" err="1">
                 <a:ln>
                   <a:noFill/>
                 </a:ln>
@@ -5196,7 +5122,7 @@
               <a:t>opcode</a:t>
             </a:r>
             <a:r>
-              <a:rPr kumimoji="0" lang="en-US" altLang="tr-TR" sz="2000" b="0" i="0" u="none" strike="noStrike" kern="0" cap="none" spc="0" normalizeH="0" baseline="0" noProof="0" dirty="0" smtClean="0">
+              <a:rPr kumimoji="0" lang="en-US" altLang="tr-TR" sz="2000" b="0" i="0" u="none" strike="noStrike" kern="0" cap="none" spc="0" normalizeH="0" baseline="0" noProof="0" dirty="0">
                 <a:ln>
                   <a:noFill/>
                 </a:ln>
@@ -5346,13 +5272,6 @@
   <p:clrMapOvr>
     <a:masterClrMapping/>
   </p:clrMapOvr>
-  <p:timing>
-    <p:tnLst>
-      <p:par>
-        <p:cTn id="1" dur="indefinite" restart="never" nodeType="tmRoot"/>
-      </p:par>
-    </p:tnLst>
-  </p:timing>
 </p:sld>
 </file>
 
@@ -5485,28 +5404,16 @@
                   <a:srgbClr val="FF0000"/>
                 </a:solidFill>
               </a:rPr>
-              <a:t>SORU </a:t>
-            </a:r>
-            <a:r>
-              <a:rPr lang="tr-TR" b="1" dirty="0" smtClean="0">
-                <a:solidFill>
-                  <a:srgbClr val="FF0000"/>
-                </a:solidFill>
-              </a:rPr>
-              <a:t>1—</a:t>
-            </a:r>
-          </a:p>
-          <a:p>
-            <a:endParaRPr lang="tr-TR" dirty="0" smtClean="0"/>
-          </a:p>
-          <a:p>
-            <a:r>
-              <a:rPr lang="tr-TR" sz="2000" dirty="0" smtClean="0"/>
-              <a:t>Aşağıdaki </a:t>
-            </a:r>
+              <a:t>SORU 1—</a:t>
+            </a:r>
+          </a:p>
+          <a:p>
+            <a:endParaRPr lang="tr-TR" dirty="0"/>
+          </a:p>
+          <a:p>
             <a:r>
               <a:rPr lang="tr-TR" sz="2000" dirty="0"/>
-              <a:t>MIPS programının amacını komutlara açıklama (</a:t>
+              <a:t>Aşağıdaki MIPS programının amacını komutlara açıklama (</a:t>
             </a:r>
             <a:r>
               <a:rPr lang="tr-TR" sz="2000" dirty="0" err="1"/>
@@ -5518,11 +5425,11 @@
             </a:r>
           </a:p>
           <a:p>
-            <a:endParaRPr lang="tr-TR" sz="2000" dirty="0" smtClean="0"/>
-          </a:p>
-          <a:p>
-            <a:r>
-              <a:rPr lang="tr-TR" sz="2000" dirty="0" smtClean="0"/>
+            <a:endParaRPr lang="tr-TR" sz="2000" dirty="0"/>
+          </a:p>
+          <a:p>
+            <a:r>
+              <a:rPr lang="tr-TR" sz="2000" dirty="0"/>
               <a:t>a0  </a:t>
             </a:r>
             <a:r>
@@ -5624,13 +5531,6 @@
   <p:clrMapOvr>
     <a:masterClrMapping/>
   </p:clrMapOvr>
-  <p:timing>
-    <p:tnLst>
-      <p:par>
-        <p:cTn id="1" dur="indefinite" restart="never" nodeType="tmRoot"/>
-      </p:par>
-    </p:tnLst>
-  </p:timing>
 </p:sld>
 </file>
 
@@ -5725,13 +5625,6 @@
   <p:clrMapOvr>
     <a:masterClrMapping/>
   </p:clrMapOvr>
-  <p:timing>
-    <p:tnLst>
-      <p:par>
-        <p:cTn id="1" dur="indefinite" restart="never" nodeType="tmRoot"/>
-      </p:par>
-    </p:tnLst>
-  </p:timing>
 </p:sld>
 </file>
 
@@ -5790,20 +5683,11 @@
               </a:rPr>
               <a:t>-  </a:t>
             </a:r>
-            <a:endParaRPr lang="tr-TR" dirty="0" smtClean="0">
-              <a:solidFill>
-                <a:srgbClr val="FF0000"/>
-              </a:solidFill>
-            </a:endParaRPr>
-          </a:p>
-          <a:p>
-            <a:r>
-              <a:rPr lang="tr-TR" dirty="0" smtClean="0"/>
-              <a:t>Aşağıda </a:t>
-            </a:r>
+          </a:p>
+          <a:p>
             <a:r>
               <a:rPr lang="tr-TR" dirty="0"/>
-              <a:t>görülen C koda karşı gelen MIPS </a:t>
+              <a:t>Aşağıda görülen C koda karşı gelen MIPS </a:t>
             </a:r>
             <a:r>
               <a:rPr lang="tr-TR" dirty="0" err="1"/>
@@ -5890,13 +5774,6 @@
   <p:clrMapOvr>
     <a:masterClrMapping/>
   </p:clrMapOvr>
-  <p:timing>
-    <p:tnLst>
-      <p:par>
-        <p:cTn id="1" dur="indefinite" restart="never" nodeType="tmRoot"/>
-      </p:par>
-    </p:tnLst>
-  </p:timing>
 </p:sld>
 </file>
 
@@ -5991,13 +5868,6 @@
   <p:clrMapOvr>
     <a:masterClrMapping/>
   </p:clrMapOvr>
-  <p:timing>
-    <p:tnLst>
-      <p:par>
-        <p:cTn id="1" dur="indefinite" restart="never" nodeType="tmRoot"/>
-      </p:par>
-    </p:tnLst>
-  </p:timing>
 </p:sld>
 </file>
 
@@ -6065,18 +5935,13 @@
           <a:lstStyle/>
           <a:p>
             <a:r>
-              <a:rPr lang="tr-TR" sz="2800" dirty="0" smtClean="0">
+              <a:rPr lang="tr-TR" sz="2800" dirty="0">
                 <a:solidFill>
                   <a:srgbClr val="FF0000"/>
                 </a:solidFill>
               </a:rPr>
               <a:t>Soru-3</a:t>
             </a:r>
-            <a:endParaRPr lang="tr-TR" sz="2800" dirty="0">
-              <a:solidFill>
-                <a:srgbClr val="FF0000"/>
-              </a:solidFill>
-            </a:endParaRPr>
           </a:p>
         </p:txBody>
       </p:sp>
@@ -6090,13 +5955,6 @@
   <p:clrMapOvr>
     <a:masterClrMapping/>
   </p:clrMapOvr>
-  <p:timing>
-    <p:tnLst>
-      <p:par>
-        <p:cTn id="1" dur="indefinite" restart="never" nodeType="tmRoot"/>
-      </p:par>
-    </p:tnLst>
-  </p:timing>
 </p:sld>
 </file>
 
@@ -6151,13 +6009,6 @@
   <p:clrMapOvr>
     <a:masterClrMapping/>
   </p:clrMapOvr>
-  <p:timing>
-    <p:tnLst>
-      <p:par>
-        <p:cTn id="1" dur="indefinite" restart="never" nodeType="tmRoot"/>
-      </p:par>
-    </p:tnLst>
-  </p:timing>
 </p:sld>
 </file>
 

</xml_diff>